<commit_message>
updated ppt with youtube link
</commit_message>
<xml_diff>
--- a/Case Study 1/Beers & Breweries/EDA/EDA Slide Deck.pptx
+++ b/Case Study 1/Beers & Breweries/EDA/EDA Slide Deck.pptx
@@ -5,7 +5,7 @@
     <p:sldMasterId id="2147483672" r:id="rId1"/>
   </p:sldMasterIdLst>
   <p:notesMasterIdLst>
-    <p:notesMasterId r:id="rId14"/>
+    <p:notesMasterId r:id="rId15"/>
   </p:notesMasterIdLst>
   <p:sldIdLst>
     <p:sldId id="580" r:id="rId2"/>
@@ -16,10 +16,11 @@
     <p:sldId id="618" r:id="rId7"/>
     <p:sldId id="620" r:id="rId8"/>
     <p:sldId id="621" r:id="rId9"/>
-    <p:sldId id="622" r:id="rId10"/>
-    <p:sldId id="625" r:id="rId11"/>
+    <p:sldId id="625" r:id="rId10"/>
+    <p:sldId id="622" r:id="rId11"/>
     <p:sldId id="624" r:id="rId12"/>
-    <p:sldId id="623" r:id="rId13"/>
+    <p:sldId id="627" r:id="rId13"/>
+    <p:sldId id="623" r:id="rId14"/>
   </p:sldIdLst>
   <p:sldSz cx="9144000" cy="6858000" type="screen4x3"/>
   <p:notesSz cx="6858000" cy="9144000"/>
@@ -220,7 +221,7 @@
           <a:p>
             <a:fld id="{AF3F099B-EF83-4692-966C-FF417F917910}" type="datetimeFigureOut">
               <a:rPr lang="en-US" smtClean="0"/>
-              <a:t>7/4/2020</a:t>
+              <a:t>7/5/2020</a:t>
             </a:fld>
             <a:endParaRPr lang="en-US"/>
           </a:p>
@@ -1122,7 +1123,7 @@
     </p:spTree>
     <p:extLst>
       <p:ext uri="{BB962C8B-B14F-4D97-AF65-F5344CB8AC3E}">
-        <p14:creationId xmlns:p14="http://schemas.microsoft.com/office/powerpoint/2010/main" val="1562861986"/>
+        <p14:creationId xmlns:p14="http://schemas.microsoft.com/office/powerpoint/2010/main" val="2449783006"/>
       </p:ext>
     </p:extLst>
   </p:cSld>
@@ -1206,7 +1207,7 @@
     </p:spTree>
     <p:extLst>
       <p:ext uri="{BB962C8B-B14F-4D97-AF65-F5344CB8AC3E}">
-        <p14:creationId xmlns:p14="http://schemas.microsoft.com/office/powerpoint/2010/main" val="2449783006"/>
+        <p14:creationId xmlns:p14="http://schemas.microsoft.com/office/powerpoint/2010/main" val="1562861986"/>
       </p:ext>
     </p:extLst>
   </p:cSld>
@@ -1291,6 +1292,90 @@
     <p:extLst>
       <p:ext uri="{BB962C8B-B14F-4D97-AF65-F5344CB8AC3E}">
         <p14:creationId xmlns:p14="http://schemas.microsoft.com/office/powerpoint/2010/main" val="3992600160"/>
+      </p:ext>
+    </p:extLst>
+  </p:cSld>
+  <p:clrMapOvr>
+    <a:masterClrMapping/>
+  </p:clrMapOvr>
+</p:notes>
+</file>
+
+<file path=ppt/notesSlides/notesSlide8.xml><?xml version="1.0" encoding="utf-8"?>
+<p:notes xmlns:a="http://schemas.openxmlformats.org/drawingml/2006/main" xmlns:r="http://schemas.openxmlformats.org/officeDocument/2006/relationships" xmlns:p="http://schemas.openxmlformats.org/presentationml/2006/main">
+  <p:cSld>
+    <p:spTree>
+      <p:nvGrpSpPr>
+        <p:cNvPr id="1" name=""/>
+        <p:cNvGrpSpPr/>
+        <p:nvPr/>
+      </p:nvGrpSpPr>
+      <p:grpSpPr>
+        <a:xfrm>
+          <a:off x="0" y="0"/>
+          <a:ext cx="0" cy="0"/>
+          <a:chOff x="0" y="0"/>
+          <a:chExt cx="0" cy="0"/>
+        </a:xfrm>
+      </p:grpSpPr>
+      <p:sp>
+        <p:nvSpPr>
+          <p:cNvPr id="2" name="Slide Image Placeholder 1"/>
+          <p:cNvSpPr>
+            <a:spLocks noGrp="1" noRot="1" noChangeAspect="1"/>
+          </p:cNvSpPr>
+          <p:nvPr>
+            <p:ph type="sldImg"/>
+          </p:nvPr>
+        </p:nvSpPr>
+        <p:spPr/>
+      </p:sp>
+      <p:sp>
+        <p:nvSpPr>
+          <p:cNvPr id="3" name="Notes Placeholder 2"/>
+          <p:cNvSpPr>
+            <a:spLocks noGrp="1"/>
+          </p:cNvSpPr>
+          <p:nvPr>
+            <p:ph type="body" idx="1"/>
+          </p:nvPr>
+        </p:nvSpPr>
+        <p:spPr/>
+        <p:txBody>
+          <a:bodyPr/>
+          <a:lstStyle/>
+          <a:p>
+            <a:endParaRPr lang="en-US" dirty="0"/>
+          </a:p>
+        </p:txBody>
+      </p:sp>
+      <p:sp>
+        <p:nvSpPr>
+          <p:cNvPr id="4" name="Slide Number Placeholder 3"/>
+          <p:cNvSpPr>
+            <a:spLocks noGrp="1"/>
+          </p:cNvSpPr>
+          <p:nvPr>
+            <p:ph type="sldNum" sz="quarter" idx="5"/>
+          </p:nvPr>
+        </p:nvSpPr>
+        <p:spPr/>
+        <p:txBody>
+          <a:bodyPr/>
+          <a:lstStyle/>
+          <a:p>
+            <a:fld id="{03E9FA41-F0FC-4798-8941-B8493B1593D5}" type="slidenum">
+              <a:rPr lang="en-US" smtClean="0"/>
+              <a:t>12</a:t>
+            </a:fld>
+            <a:endParaRPr lang="en-US"/>
+          </a:p>
+        </p:txBody>
+      </p:sp>
+    </p:spTree>
+    <p:extLst>
+      <p:ext uri="{BB962C8B-B14F-4D97-AF65-F5344CB8AC3E}">
+        <p14:creationId xmlns:p14="http://schemas.microsoft.com/office/powerpoint/2010/main" val="477783032"/>
       </p:ext>
     </p:extLst>
   </p:cSld>
@@ -3506,7 +3591,7 @@
           <a:p>
             <a:r>
               <a:rPr lang="en-US" sz="1400" dirty="0"/>
-              <a:t>An analysis of the brewing industry</a:t>
+              <a:t>An analysis of the brewing industry for Budweiser</a:t>
             </a:r>
           </a:p>
         </p:txBody>
@@ -3557,12 +3642,7 @@
             <p:ph type="title"/>
           </p:nvPr>
         </p:nvSpPr>
-        <p:spPr>
-          <a:xfrm>
-            <a:off x="457200" y="228599"/>
-            <a:ext cx="8229600" cy="1047641"/>
-          </a:xfrm>
-        </p:spPr>
+        <p:spPr/>
         <p:txBody>
           <a:bodyPr/>
           <a:lstStyle/>
@@ -3570,17 +3650,17 @@
             <a:pPr algn="l"/>
             <a:r>
               <a:rPr lang="en-US" sz="3200" dirty="0"/>
-              <a:t>Correlation Between % ABV &amp; IBU</a:t>
-            </a:r>
-          </a:p>
-        </p:txBody>
-      </p:sp>
-      <p:sp>
-        <p:nvSpPr>
-          <p:cNvPr id="64" name="TextBox 63">
+              <a:t>% ABV Compared to IBU</a:t>
+            </a:r>
+          </a:p>
+        </p:txBody>
+      </p:sp>
+      <p:sp>
+        <p:nvSpPr>
+          <p:cNvPr id="8" name="TextBox 7">
             <a:extLst>
               <a:ext uri="{FF2B5EF4-FFF2-40B4-BE49-F238E27FC236}">
-                <a16:creationId xmlns:a16="http://schemas.microsoft.com/office/drawing/2014/main" id="{7EEBF988-27FF-4B8C-886D-21437243F97A}"/>
+                <a16:creationId xmlns:a16="http://schemas.microsoft.com/office/drawing/2014/main" id="{F6055A0B-FB0C-41A5-86F9-0F002D2AB4E0}"/>
               </a:ext>
             </a:extLst>
           </p:cNvPr>
@@ -3589,8 +3669,8 @@
         </p:nvSpPr>
         <p:spPr>
           <a:xfrm>
-            <a:off x="457200" y="1452710"/>
-            <a:ext cx="6758412" cy="1200329"/>
+            <a:off x="457200" y="1371600"/>
+            <a:ext cx="8229600" cy="1815882"/>
           </a:xfrm>
           <a:prstGeom prst="rect">
             <a:avLst/>
@@ -3603,89 +3683,73 @@
           </a:bodyPr>
           <a:lstStyle/>
           <a:p>
-            <a:r>
-              <a:rPr lang="en-US" sz="1200" dirty="0"/>
-              <a:t>There is overwhelming evidence that ABV and IBU are linearly correlated (p-value = &lt;.0001). </a:t>
-            </a:r>
-          </a:p>
-          <a:p>
-            <a:endParaRPr lang="en-US" sz="1200" dirty="0"/>
-          </a:p>
-          <a:p>
-            <a:r>
-              <a:rPr lang="en-US" sz="1200" dirty="0"/>
-              <a:t>60% of the variation in %ABV is explained by IBU</a:t>
-            </a:r>
-          </a:p>
-          <a:p>
-            <a:endParaRPr lang="en-US" sz="1200" dirty="0"/>
-          </a:p>
-          <a:p>
-            <a:r>
-              <a:rPr lang="en-US" sz="1200" dirty="0"/>
-              <a:t>Study was observational and by no means intends to establish causation between %ABV and IBU</a:t>
-            </a:r>
-          </a:p>
-        </p:txBody>
-      </p:sp>
-      <p:sp>
-        <p:nvSpPr>
-          <p:cNvPr id="17" name="Rectangle 16">
+            <a:pPr marL="285750" indent="-285750">
+              <a:buFont typeface="Arial" panose="020B0604020202020204" pitchFamily="34" charset="0"/>
+              <a:buChar char="•"/>
+            </a:pPr>
+            <a:r>
+              <a:rPr lang="en-US" sz="1400" dirty="0"/>
+              <a:t>Values are not interdependent:</a:t>
+            </a:r>
+          </a:p>
+          <a:p>
+            <a:pPr marL="742950" lvl="1" indent="-285750">
+              <a:buFont typeface="Arial" panose="020B0604020202020204" pitchFamily="34" charset="0"/>
+              <a:buChar char="•"/>
+            </a:pPr>
+            <a:r>
+              <a:rPr lang="en-US" sz="1400" dirty="0"/>
+              <a:t>% ABV is determined by yeast amount and time to ferment</a:t>
+            </a:r>
+          </a:p>
+          <a:p>
+            <a:pPr marL="742950" lvl="1" indent="-285750">
+              <a:buFont typeface="Arial" panose="020B0604020202020204" pitchFamily="34" charset="0"/>
+              <a:buChar char="•"/>
+            </a:pPr>
+            <a:r>
+              <a:rPr lang="en-US" sz="1400" dirty="0"/>
+              <a:t>IBU is a result of quantity/type of hops</a:t>
+            </a:r>
+          </a:p>
+          <a:p>
+            <a:pPr marL="285750" indent="-285750">
+              <a:buFont typeface="Arial" panose="020B0604020202020204" pitchFamily="34" charset="0"/>
+              <a:buChar char="•"/>
+            </a:pPr>
+            <a:endParaRPr lang="en-US" sz="1400" dirty="0"/>
+          </a:p>
+          <a:p>
+            <a:pPr marL="285750" indent="-285750">
+              <a:buFont typeface="Arial" panose="020B0604020202020204" pitchFamily="34" charset="0"/>
+              <a:buChar char="•"/>
+            </a:pPr>
+            <a:r>
+              <a:rPr lang="en-US" sz="1400" dirty="0"/>
+              <a:t>Breweries are making higher % ABV beers with higher IBU, with exceptions. Why? </a:t>
+            </a:r>
+          </a:p>
+          <a:p>
+            <a:pPr marL="742950" lvl="1" indent="-285750">
+              <a:buFont typeface="Arial" panose="020B0604020202020204" pitchFamily="34" charset="0"/>
+              <a:buChar char="•"/>
+            </a:pPr>
+            <a:r>
+              <a:rPr lang="en-US" sz="1400" dirty="0"/>
+              <a:t>Consider surveying to find if customer preferences between the two are related. Does the higher IBU make higher ABV more palatable?</a:t>
+            </a:r>
+          </a:p>
+          <a:p>
+            <a:endParaRPr lang="en-US" sz="1400" dirty="0"/>
+          </a:p>
+        </p:txBody>
+      </p:sp>
+      <p:pic>
+        <p:nvPicPr>
+          <p:cNvPr id="6" name="Picture 5">
             <a:extLst>
               <a:ext uri="{FF2B5EF4-FFF2-40B4-BE49-F238E27FC236}">
-                <a16:creationId xmlns:a16="http://schemas.microsoft.com/office/drawing/2014/main" id="{1ECAE68E-8650-4CD7-9516-91762A5D6E8C}"/>
-              </a:ext>
-            </a:extLst>
-          </p:cNvPr>
-          <p:cNvSpPr/>
-          <p:nvPr/>
-        </p:nvSpPr>
-        <p:spPr>
-          <a:xfrm>
-            <a:off x="457200" y="3347286"/>
-            <a:ext cx="1019908" cy="369886"/>
-          </a:xfrm>
-          <a:prstGeom prst="rect">
-            <a:avLst/>
-          </a:prstGeom>
-          <a:noFill/>
-          <a:ln>
-            <a:solidFill>
-              <a:srgbClr val="FFC000"/>
-            </a:solidFill>
-          </a:ln>
-        </p:spPr>
-        <p:style>
-          <a:lnRef idx="2">
-            <a:schemeClr val="accent1">
-              <a:shade val="50000"/>
-            </a:schemeClr>
-          </a:lnRef>
-          <a:fillRef idx="1">
-            <a:schemeClr val="accent1"/>
-          </a:fillRef>
-          <a:effectRef idx="0">
-            <a:schemeClr val="accent1"/>
-          </a:effectRef>
-          <a:fontRef idx="minor">
-            <a:schemeClr val="lt1"/>
-          </a:fontRef>
-        </p:style>
-        <p:txBody>
-          <a:bodyPr rtlCol="0" anchor="ctr"/>
-          <a:lstStyle/>
-          <a:p>
-            <a:pPr algn="ctr"/>
-            <a:endParaRPr lang="en-US"/>
-          </a:p>
-        </p:txBody>
-      </p:sp>
-      <p:pic>
-        <p:nvPicPr>
-          <p:cNvPr id="7" name="Picture 6">
-            <a:extLst>
-              <a:ext uri="{FF2B5EF4-FFF2-40B4-BE49-F238E27FC236}">
-                <a16:creationId xmlns:a16="http://schemas.microsoft.com/office/drawing/2014/main" id="{954DDF8B-8062-4FA4-91A5-E142BDB100B0}"/>
+                <a16:creationId xmlns:a16="http://schemas.microsoft.com/office/drawing/2014/main" id="{19B8CF5D-9A96-45A8-AC7A-7C76A320B08D}"/>
               </a:ext>
             </a:extLst>
           </p:cNvPr>
@@ -3713,7 +3777,7 @@
     </p:spTree>
     <p:extLst>
       <p:ext uri="{BB962C8B-B14F-4D97-AF65-F5344CB8AC3E}">
-        <p14:creationId xmlns:p14="http://schemas.microsoft.com/office/powerpoint/2010/main" val="1228702839"/>
+        <p14:creationId xmlns:p14="http://schemas.microsoft.com/office/powerpoint/2010/main" val="3084316580"/>
       </p:ext>
     </p:extLst>
   </p:cSld>
@@ -4374,6 +4438,108 @@
           <p:cNvPr id="2" name="Title 1">
             <a:extLst>
               <a:ext uri="{FF2B5EF4-FFF2-40B4-BE49-F238E27FC236}">
+                <a16:creationId xmlns:a16="http://schemas.microsoft.com/office/drawing/2014/main" id="{5B931770-76C9-F749-9B7D-08A4A1F13896}"/>
+              </a:ext>
+            </a:extLst>
+          </p:cNvPr>
+          <p:cNvSpPr>
+            <a:spLocks noGrp="1"/>
+          </p:cNvSpPr>
+          <p:nvPr>
+            <p:ph type="title"/>
+          </p:nvPr>
+        </p:nvSpPr>
+        <p:spPr>
+          <a:xfrm>
+            <a:off x="457200" y="228599"/>
+            <a:ext cx="8229600" cy="1047641"/>
+          </a:xfrm>
+        </p:spPr>
+        <p:txBody>
+          <a:bodyPr/>
+          <a:lstStyle/>
+          <a:p>
+            <a:pPr algn="l"/>
+            <a:r>
+              <a:rPr lang="en-US" sz="3200" dirty="0"/>
+              <a:t>Link</a:t>
+            </a:r>
+          </a:p>
+        </p:txBody>
+      </p:sp>
+      <p:sp>
+        <p:nvSpPr>
+          <p:cNvPr id="64" name="TextBox 63">
+            <a:extLst>
+              <a:ext uri="{FF2B5EF4-FFF2-40B4-BE49-F238E27FC236}">
+                <a16:creationId xmlns:a16="http://schemas.microsoft.com/office/drawing/2014/main" id="{7EEBF988-27FF-4B8C-886D-21437243F97A}"/>
+              </a:ext>
+            </a:extLst>
+          </p:cNvPr>
+          <p:cNvSpPr txBox="1"/>
+          <p:nvPr/>
+        </p:nvSpPr>
+        <p:spPr>
+          <a:xfrm>
+            <a:off x="457200" y="1395323"/>
+            <a:ext cx="8229600" cy="861774"/>
+          </a:xfrm>
+          <a:prstGeom prst="rect">
+            <a:avLst/>
+          </a:prstGeom>
+          <a:noFill/>
+        </p:spPr>
+        <p:txBody>
+          <a:bodyPr wrap="square" rtlCol="0">
+            <a:spAutoFit/>
+          </a:bodyPr>
+          <a:lstStyle/>
+          <a:p>
+            <a:endParaRPr lang="en-US" sz="1400" u="sng" dirty="0"/>
+          </a:p>
+          <a:p>
+            <a:r>
+              <a:rPr lang="en-US" sz="3600" dirty="0"/>
+              <a:t>https://youtu.be/xGFg6L0SxzU</a:t>
+            </a:r>
+          </a:p>
+        </p:txBody>
+      </p:sp>
+    </p:spTree>
+    <p:extLst>
+      <p:ext uri="{BB962C8B-B14F-4D97-AF65-F5344CB8AC3E}">
+        <p14:creationId xmlns:p14="http://schemas.microsoft.com/office/powerpoint/2010/main" val="1970918371"/>
+      </p:ext>
+    </p:extLst>
+  </p:cSld>
+  <p:clrMapOvr>
+    <a:masterClrMapping/>
+  </p:clrMapOvr>
+</p:sld>
+</file>
+
+<file path=ppt/slides/slide13.xml><?xml version="1.0" encoding="utf-8"?>
+<p:sld xmlns:a="http://schemas.openxmlformats.org/drawingml/2006/main" xmlns:r="http://schemas.openxmlformats.org/officeDocument/2006/relationships" xmlns:p="http://schemas.openxmlformats.org/presentationml/2006/main">
+  <p:cSld>
+    <p:spTree>
+      <p:nvGrpSpPr>
+        <p:cNvPr id="1" name=""/>
+        <p:cNvGrpSpPr/>
+        <p:nvPr/>
+      </p:nvGrpSpPr>
+      <p:grpSpPr>
+        <a:xfrm>
+          <a:off x="0" y="0"/>
+          <a:ext cx="0" cy="0"/>
+          <a:chOff x="0" y="0"/>
+          <a:chExt cx="0" cy="0"/>
+        </a:xfrm>
+      </p:grpSpPr>
+      <p:sp>
+        <p:nvSpPr>
+          <p:cNvPr id="2" name="Title 1">
+            <a:extLst>
+              <a:ext uri="{FF2B5EF4-FFF2-40B4-BE49-F238E27FC236}">
                 <a16:creationId xmlns:a16="http://schemas.microsoft.com/office/drawing/2014/main" id="{E35C5164-77DA-41AB-9F46-BFE0C7FD3975}"/>
               </a:ext>
             </a:extLst>
@@ -4572,6 +4738,12 @@
           <a:p>
             <a:r>
               <a:rPr lang="en-US" sz="2800" dirty="0"/>
+              <a:t>Data Cleaning </a:t>
+            </a:r>
+          </a:p>
+          <a:p>
+            <a:r>
+              <a:rPr lang="en-US" sz="2800" dirty="0"/>
               <a:t>Breweries by State </a:t>
             </a:r>
           </a:p>
@@ -4585,6 +4757,12 @@
             <a:r>
               <a:rPr lang="en-US" sz="2800" dirty="0"/>
               <a:t>IBU Analysis by State</a:t>
+            </a:r>
+          </a:p>
+          <a:p>
+            <a:r>
+              <a:rPr lang="en-US" sz="2800" dirty="0"/>
+              <a:t>Summary of ABV Data </a:t>
             </a:r>
           </a:p>
           <a:p>
@@ -5110,6 +5288,58 @@
           </a:p>
         </p:txBody>
       </p:sp>
+      <p:sp>
+        <p:nvSpPr>
+          <p:cNvPr id="4" name="Rectangle 3">
+            <a:extLst>
+              <a:ext uri="{FF2B5EF4-FFF2-40B4-BE49-F238E27FC236}">
+                <a16:creationId xmlns:a16="http://schemas.microsoft.com/office/drawing/2014/main" id="{00EE9439-79B9-4B3B-A50E-66196EDE2B6E}"/>
+              </a:ext>
+            </a:extLst>
+          </p:cNvPr>
+          <p:cNvSpPr/>
+          <p:nvPr/>
+        </p:nvSpPr>
+        <p:spPr>
+          <a:xfrm>
+            <a:off x="5919019" y="4630994"/>
+            <a:ext cx="1835274" cy="1101927"/>
+          </a:xfrm>
+          <a:prstGeom prst="rect">
+            <a:avLst/>
+          </a:prstGeom>
+          <a:noFill/>
+          <a:ln>
+            <a:solidFill>
+              <a:srgbClr val="FF0000"/>
+            </a:solidFill>
+          </a:ln>
+        </p:spPr>
+        <p:style>
+          <a:lnRef idx="2">
+            <a:schemeClr val="accent1">
+              <a:shade val="50000"/>
+            </a:schemeClr>
+          </a:lnRef>
+          <a:fillRef idx="1">
+            <a:schemeClr val="accent1"/>
+          </a:fillRef>
+          <a:effectRef idx="0">
+            <a:schemeClr val="accent1"/>
+          </a:effectRef>
+          <a:fontRef idx="minor">
+            <a:schemeClr val="lt1"/>
+          </a:fontRef>
+        </p:style>
+        <p:txBody>
+          <a:bodyPr rtlCol="0" anchor="ctr"/>
+          <a:lstStyle/>
+          <a:p>
+            <a:pPr algn="ctr"/>
+            <a:endParaRPr lang="en-US"/>
+          </a:p>
+        </p:txBody>
+      </p:sp>
     </p:spTree>
     <p:extLst>
       <p:ext uri="{BB962C8B-B14F-4D97-AF65-F5344CB8AC3E}">
@@ -5204,17 +5434,6 @@
               <a:t>DC in top 5 median ABV, WV in top 5 ABV &amp; IBU. </a:t>
             </a:r>
           </a:p>
-          <a:p>
-            <a:pPr>
-              <a:buFont typeface="Arial" panose="020B0604020202020204" pitchFamily="34" charset="0"/>
-              <a:buChar char="•"/>
-            </a:pPr>
-            <a:r>
-              <a:rPr lang="en-US" sz="1800" dirty="0"/>
-              <a:t>Untapped markets for lower alcohol beers.</a:t>
-            </a:r>
-            <a:endParaRPr lang="en-US" sz="2000" dirty="0"/>
-          </a:p>
         </p:txBody>
       </p:sp>
       <p:pic>
@@ -5239,8 +5458,8 @@
         </p:blipFill>
         <p:spPr>
           <a:xfrm>
-            <a:off x="320467" y="2256989"/>
-            <a:ext cx="8503065" cy="4476025"/>
+            <a:off x="225603" y="1990744"/>
+            <a:ext cx="8597930" cy="4525962"/>
           </a:xfrm>
           <a:prstGeom prst="rect">
             <a:avLst/>
@@ -5520,8 +5739,8 @@
         </p:blipFill>
         <p:spPr>
           <a:xfrm>
-            <a:off x="37708" y="1811756"/>
-            <a:ext cx="9030878" cy="4686213"/>
+            <a:off x="241084" y="1986116"/>
+            <a:ext cx="8694866" cy="4511853"/>
           </a:xfrm>
           <a:prstGeom prst="rect">
             <a:avLst/>
@@ -5574,7 +5793,12 @@
             <p:ph type="title"/>
           </p:nvPr>
         </p:nvSpPr>
-        <p:spPr/>
+        <p:spPr>
+          <a:xfrm>
+            <a:off x="457200" y="228599"/>
+            <a:ext cx="8229600" cy="1047641"/>
+          </a:xfrm>
+        </p:spPr>
         <p:txBody>
           <a:bodyPr/>
           <a:lstStyle/>
@@ -5582,17 +5806,17 @@
             <a:pPr algn="l"/>
             <a:r>
               <a:rPr lang="en-US" sz="3200" dirty="0"/>
-              <a:t>% ABV Compared to IBU</a:t>
-            </a:r>
-          </a:p>
-        </p:txBody>
-      </p:sp>
-      <p:sp>
-        <p:nvSpPr>
-          <p:cNvPr id="8" name="TextBox 7">
+              <a:t>Correlation Between % ABV &amp; IBU</a:t>
+            </a:r>
+          </a:p>
+        </p:txBody>
+      </p:sp>
+      <p:sp>
+        <p:nvSpPr>
+          <p:cNvPr id="64" name="TextBox 63">
             <a:extLst>
               <a:ext uri="{FF2B5EF4-FFF2-40B4-BE49-F238E27FC236}">
-                <a16:creationId xmlns:a16="http://schemas.microsoft.com/office/drawing/2014/main" id="{F6055A0B-FB0C-41A5-86F9-0F002D2AB4E0}"/>
+                <a16:creationId xmlns:a16="http://schemas.microsoft.com/office/drawing/2014/main" id="{7EEBF988-27FF-4B8C-886D-21437243F97A}"/>
               </a:ext>
             </a:extLst>
           </p:cNvPr>
@@ -5601,8 +5825,8 @@
         </p:nvSpPr>
         <p:spPr>
           <a:xfrm>
-            <a:off x="457200" y="1371600"/>
-            <a:ext cx="8229600" cy="1815882"/>
+            <a:off x="457200" y="1452710"/>
+            <a:ext cx="6758412" cy="1200329"/>
           </a:xfrm>
           <a:prstGeom prst="rect">
             <a:avLst/>
@@ -5615,73 +5839,89 @@
           </a:bodyPr>
           <a:lstStyle/>
           <a:p>
-            <a:pPr marL="285750" indent="-285750">
-              <a:buFont typeface="Arial" panose="020B0604020202020204" pitchFamily="34" charset="0"/>
-              <a:buChar char="•"/>
-            </a:pPr>
-            <a:r>
-              <a:rPr lang="en-US" sz="1400" dirty="0"/>
-              <a:t>Values are not interdependent:</a:t>
-            </a:r>
-          </a:p>
-          <a:p>
-            <a:pPr marL="742950" lvl="1" indent="-285750">
-              <a:buFont typeface="Arial" panose="020B0604020202020204" pitchFamily="34" charset="0"/>
-              <a:buChar char="•"/>
-            </a:pPr>
-            <a:r>
-              <a:rPr lang="en-US" sz="1400" dirty="0"/>
-              <a:t>% ABV is determined by yeast amount and time to ferment</a:t>
-            </a:r>
-          </a:p>
-          <a:p>
-            <a:pPr marL="742950" lvl="1" indent="-285750">
-              <a:buFont typeface="Arial" panose="020B0604020202020204" pitchFamily="34" charset="0"/>
-              <a:buChar char="•"/>
-            </a:pPr>
-            <a:r>
-              <a:rPr lang="en-US" sz="1400" dirty="0"/>
-              <a:t>IBU is a result of quantity/type of hops</a:t>
-            </a:r>
-          </a:p>
-          <a:p>
-            <a:pPr marL="285750" indent="-285750">
-              <a:buFont typeface="Arial" panose="020B0604020202020204" pitchFamily="34" charset="0"/>
-              <a:buChar char="•"/>
-            </a:pPr>
-            <a:endParaRPr lang="en-US" sz="1400" dirty="0"/>
-          </a:p>
-          <a:p>
-            <a:pPr marL="285750" indent="-285750">
-              <a:buFont typeface="Arial" panose="020B0604020202020204" pitchFamily="34" charset="0"/>
-              <a:buChar char="•"/>
-            </a:pPr>
-            <a:r>
-              <a:rPr lang="en-US" sz="1400" dirty="0"/>
-              <a:t>Breweries are making higher % ABV beers with higher IBU, with exceptions. Why? </a:t>
-            </a:r>
-          </a:p>
-          <a:p>
-            <a:pPr marL="742950" lvl="1" indent="-285750">
-              <a:buFont typeface="Arial" panose="020B0604020202020204" pitchFamily="34" charset="0"/>
-              <a:buChar char="•"/>
-            </a:pPr>
-            <a:r>
-              <a:rPr lang="en-US" sz="1400" dirty="0"/>
-              <a:t>Consider surveying to find if customer preferences between the two are related. Does the higher IBU make higher ABV more palatable?</a:t>
-            </a:r>
-          </a:p>
-          <a:p>
-            <a:endParaRPr lang="en-US" sz="1400" dirty="0"/>
+            <a:r>
+              <a:rPr lang="en-US" sz="1200" dirty="0"/>
+              <a:t>There is overwhelming evidence that ABV and IBU are linearly correlated (p-value = &lt;.0001). </a:t>
+            </a:r>
+          </a:p>
+          <a:p>
+            <a:endParaRPr lang="en-US" sz="1200" dirty="0"/>
+          </a:p>
+          <a:p>
+            <a:r>
+              <a:rPr lang="en-US" sz="1200" dirty="0"/>
+              <a:t>60% of the variation in %ABV is explained by IBU</a:t>
+            </a:r>
+          </a:p>
+          <a:p>
+            <a:endParaRPr lang="en-US" sz="1200" dirty="0"/>
+          </a:p>
+          <a:p>
+            <a:r>
+              <a:rPr lang="en-US" sz="1200" dirty="0"/>
+              <a:t>Study was observational and by no means intends to establish causation between %ABV and IBU</a:t>
+            </a:r>
+          </a:p>
+        </p:txBody>
+      </p:sp>
+      <p:sp>
+        <p:nvSpPr>
+          <p:cNvPr id="17" name="Rectangle 16">
+            <a:extLst>
+              <a:ext uri="{FF2B5EF4-FFF2-40B4-BE49-F238E27FC236}">
+                <a16:creationId xmlns:a16="http://schemas.microsoft.com/office/drawing/2014/main" id="{1ECAE68E-8650-4CD7-9516-91762A5D6E8C}"/>
+              </a:ext>
+            </a:extLst>
+          </p:cNvPr>
+          <p:cNvSpPr/>
+          <p:nvPr/>
+        </p:nvSpPr>
+        <p:spPr>
+          <a:xfrm>
+            <a:off x="457200" y="3347286"/>
+            <a:ext cx="1019908" cy="369886"/>
+          </a:xfrm>
+          <a:prstGeom prst="rect">
+            <a:avLst/>
+          </a:prstGeom>
+          <a:noFill/>
+          <a:ln>
+            <a:solidFill>
+              <a:srgbClr val="FFC000"/>
+            </a:solidFill>
+          </a:ln>
+        </p:spPr>
+        <p:style>
+          <a:lnRef idx="2">
+            <a:schemeClr val="accent1">
+              <a:shade val="50000"/>
+            </a:schemeClr>
+          </a:lnRef>
+          <a:fillRef idx="1">
+            <a:schemeClr val="accent1"/>
+          </a:fillRef>
+          <a:effectRef idx="0">
+            <a:schemeClr val="accent1"/>
+          </a:effectRef>
+          <a:fontRef idx="minor">
+            <a:schemeClr val="lt1"/>
+          </a:fontRef>
+        </p:style>
+        <p:txBody>
+          <a:bodyPr rtlCol="0" anchor="ctr"/>
+          <a:lstStyle/>
+          <a:p>
+            <a:pPr algn="ctr"/>
+            <a:endParaRPr lang="en-US"/>
           </a:p>
         </p:txBody>
       </p:sp>
       <p:pic>
         <p:nvPicPr>
-          <p:cNvPr id="6" name="Picture 5">
+          <p:cNvPr id="7" name="Picture 6">
             <a:extLst>
               <a:ext uri="{FF2B5EF4-FFF2-40B4-BE49-F238E27FC236}">
-                <a16:creationId xmlns:a16="http://schemas.microsoft.com/office/drawing/2014/main" id="{19B8CF5D-9A96-45A8-AC7A-7C76A320B08D}"/>
+                <a16:creationId xmlns:a16="http://schemas.microsoft.com/office/drawing/2014/main" id="{954DDF8B-8062-4FA4-91A5-E142BDB100B0}"/>
               </a:ext>
             </a:extLst>
           </p:cNvPr>
@@ -5709,7 +5949,7 @@
     </p:spTree>
     <p:extLst>
       <p:ext uri="{BB962C8B-B14F-4D97-AF65-F5344CB8AC3E}">
-        <p14:creationId xmlns:p14="http://schemas.microsoft.com/office/powerpoint/2010/main" val="3084316580"/>
+        <p14:creationId xmlns:p14="http://schemas.microsoft.com/office/powerpoint/2010/main" val="1228702839"/>
       </p:ext>
     </p:extLst>
   </p:cSld>

</xml_diff>